<commit_message>
Uploading updated ML flowchat
</commit_message>
<xml_diff>
--- a/ML_model_draft.pptx
+++ b/ML_model_draft.pptx
@@ -6,7 +6,6 @@
   </p:sldMasterIdLst>
   <p:sldIdLst>
     <p:sldId id="338" r:id="rId5"/>
-    <p:sldId id="339" r:id="rId6"/>
   </p:sldIdLst>
   <p:sldSz cx="12192000" cy="6858000"/>
   <p:notesSz cx="6858000" cy="9144000"/>
@@ -128,13 +127,13 @@
 <pc:chgInfo xmlns:a="http://schemas.openxmlformats.org/drawingml/2006/main" xmlns:r="http://schemas.openxmlformats.org/officeDocument/2006/relationships" xmlns:ac="http://schemas.microsoft.com/office/drawing/2013/main/command" xmlns:pc="http://schemas.microsoft.com/office/powerpoint/2013/main/command">
   <pc:docChgLst>
     <pc:chgData name="Josh Stephens" userId="3c9335bfab62eb48" providerId="LiveId" clId="{B08DCA5E-E7AD-456B-8EC6-A9C383E8EF64}"/>
-    <pc:docChg chg="undo custSel modSld modMainMaster">
-      <pc:chgData name="Josh Stephens" userId="3c9335bfab62eb48" providerId="LiveId" clId="{B08DCA5E-E7AD-456B-8EC6-A9C383E8EF64}" dt="2021-09-12T19:04:10.491" v="2051" actId="2085"/>
+    <pc:docChg chg="undo custSel delSld modSld modMainMaster">
+      <pc:chgData name="Josh Stephens" userId="3c9335bfab62eb48" providerId="LiveId" clId="{B08DCA5E-E7AD-456B-8EC6-A9C383E8EF64}" dt="2021-09-22T16:07:06.611" v="3217" actId="255"/>
       <pc:docMkLst>
         <pc:docMk/>
       </pc:docMkLst>
       <pc:sldChg chg="addSp delSp modSp mod">
-        <pc:chgData name="Josh Stephens" userId="3c9335bfab62eb48" providerId="LiveId" clId="{B08DCA5E-E7AD-456B-8EC6-A9C383E8EF64}" dt="2021-09-12T19:02:59.733" v="2046" actId="1076"/>
+        <pc:chgData name="Josh Stephens" userId="3c9335bfab62eb48" providerId="LiveId" clId="{B08DCA5E-E7AD-456B-8EC6-A9C383E8EF64}" dt="2021-09-22T16:07:06.611" v="3217" actId="255"/>
         <pc:sldMkLst>
           <pc:docMk/>
           <pc:sldMk cId="0" sldId="338"/>
@@ -148,7 +147,7 @@
           </ac:spMkLst>
         </pc:spChg>
         <pc:spChg chg="mod">
-          <ac:chgData name="Josh Stephens" userId="3c9335bfab62eb48" providerId="LiveId" clId="{B08DCA5E-E7AD-456B-8EC6-A9C383E8EF64}" dt="2021-09-12T18:39:30.793" v="1117" actId="255"/>
+          <ac:chgData name="Josh Stephens" userId="3c9335bfab62eb48" providerId="LiveId" clId="{B08DCA5E-E7AD-456B-8EC6-A9C383E8EF64}" dt="2021-09-22T15:50:14.325" v="2064" actId="20577"/>
           <ac:spMkLst>
             <pc:docMk/>
             <pc:sldMk cId="0" sldId="338"/>
@@ -156,7 +155,7 @@
           </ac:spMkLst>
         </pc:spChg>
         <pc:spChg chg="mod">
-          <ac:chgData name="Josh Stephens" userId="3c9335bfab62eb48" providerId="LiveId" clId="{B08DCA5E-E7AD-456B-8EC6-A9C383E8EF64}" dt="2021-09-12T19:01:20.875" v="2038" actId="1076"/>
+          <ac:chgData name="Josh Stephens" userId="3c9335bfab62eb48" providerId="LiveId" clId="{B08DCA5E-E7AD-456B-8EC6-A9C383E8EF64}" dt="2021-09-22T15:51:52.293" v="2088" actId="20577"/>
           <ac:spMkLst>
             <pc:docMk/>
             <pc:sldMk cId="0" sldId="338"/>
@@ -164,7 +163,7 @@
           </ac:spMkLst>
         </pc:spChg>
         <pc:spChg chg="mod">
-          <ac:chgData name="Josh Stephens" userId="3c9335bfab62eb48" providerId="LiveId" clId="{B08DCA5E-E7AD-456B-8EC6-A9C383E8EF64}" dt="2021-09-12T19:01:24.644" v="2039" actId="1076"/>
+          <ac:chgData name="Josh Stephens" userId="3c9335bfab62eb48" providerId="LiveId" clId="{B08DCA5E-E7AD-456B-8EC6-A9C383E8EF64}" dt="2021-09-22T15:51:44.811" v="2078" actId="20577"/>
           <ac:spMkLst>
             <pc:docMk/>
             <pc:sldMk cId="0" sldId="338"/>
@@ -172,7 +171,7 @@
           </ac:spMkLst>
         </pc:spChg>
         <pc:spChg chg="mod">
-          <ac:chgData name="Josh Stephens" userId="3c9335bfab62eb48" providerId="LiveId" clId="{B08DCA5E-E7AD-456B-8EC6-A9C383E8EF64}" dt="2021-09-12T18:32:52.156" v="734" actId="20577"/>
+          <ac:chgData name="Josh Stephens" userId="3c9335bfab62eb48" providerId="LiveId" clId="{B08DCA5E-E7AD-456B-8EC6-A9C383E8EF64}" dt="2021-09-22T15:52:42.831" v="2221" actId="20577"/>
           <ac:spMkLst>
             <pc:docMk/>
             <pc:sldMk cId="0" sldId="338"/>
@@ -195,8 +194,8 @@
             <ac:spMk id="10" creationId="{CAF9BEBE-89F1-4437-BA39-9A2D865BB987}"/>
           </ac:spMkLst>
         </pc:spChg>
-        <pc:spChg chg="mod">
-          <ac:chgData name="Josh Stephens" userId="3c9335bfab62eb48" providerId="LiveId" clId="{B08DCA5E-E7AD-456B-8EC6-A9C383E8EF64}" dt="2021-09-12T19:02:55.956" v="2045" actId="1076"/>
+        <pc:spChg chg="del mod">
+          <ac:chgData name="Josh Stephens" userId="3c9335bfab62eb48" providerId="LiveId" clId="{B08DCA5E-E7AD-456B-8EC6-A9C383E8EF64}" dt="2021-09-22T15:54:41.171" v="2405" actId="21"/>
           <ac:spMkLst>
             <pc:docMk/>
             <pc:sldMk cId="0" sldId="338"/>
@@ -204,7 +203,7 @@
           </ac:spMkLst>
         </pc:spChg>
         <pc:spChg chg="mod">
-          <ac:chgData name="Josh Stephens" userId="3c9335bfab62eb48" providerId="LiveId" clId="{B08DCA5E-E7AD-456B-8EC6-A9C383E8EF64}" dt="2021-09-12T18:27:04.140" v="542" actId="20577"/>
+          <ac:chgData name="Josh Stephens" userId="3c9335bfab62eb48" providerId="LiveId" clId="{B08DCA5E-E7AD-456B-8EC6-A9C383E8EF64}" dt="2021-09-22T15:54:19.392" v="2402" actId="20577"/>
           <ac:spMkLst>
             <pc:docMk/>
             <pc:sldMk cId="0" sldId="338"/>
@@ -228,7 +227,7 @@
           </ac:spMkLst>
         </pc:spChg>
         <pc:spChg chg="mod">
-          <ac:chgData name="Josh Stephens" userId="3c9335bfab62eb48" providerId="LiveId" clId="{B08DCA5E-E7AD-456B-8EC6-A9C383E8EF64}" dt="2021-09-12T18:40:05.016" v="1126" actId="20577"/>
+          <ac:chgData name="Josh Stephens" userId="3c9335bfab62eb48" providerId="LiveId" clId="{B08DCA5E-E7AD-456B-8EC6-A9C383E8EF64}" dt="2021-09-22T15:55:47.709" v="2478" actId="20577"/>
           <ac:spMkLst>
             <pc:docMk/>
             <pc:sldMk cId="0" sldId="338"/>
@@ -260,7 +259,7 @@
           </ac:spMkLst>
         </pc:spChg>
         <pc:spChg chg="mod">
-          <ac:chgData name="Josh Stephens" userId="3c9335bfab62eb48" providerId="LiveId" clId="{B08DCA5E-E7AD-456B-8EC6-A9C383E8EF64}" dt="2021-09-12T18:40:38.462" v="1130" actId="255"/>
+          <ac:chgData name="Josh Stephens" userId="3c9335bfab62eb48" providerId="LiveId" clId="{B08DCA5E-E7AD-456B-8EC6-A9C383E8EF64}" dt="2021-09-22T16:05:50.555" v="3188" actId="255"/>
           <ac:spMkLst>
             <pc:docMk/>
             <pc:sldMk cId="0" sldId="338"/>
@@ -300,7 +299,7 @@
           </ac:spMkLst>
         </pc:spChg>
         <pc:spChg chg="mod">
-          <ac:chgData name="Josh Stephens" userId="3c9335bfab62eb48" providerId="LiveId" clId="{B08DCA5E-E7AD-456B-8EC6-A9C383E8EF64}" dt="2021-09-12T18:24:09.004" v="369" actId="20577"/>
+          <ac:chgData name="Josh Stephens" userId="3c9335bfab62eb48" providerId="LiveId" clId="{B08DCA5E-E7AD-456B-8EC6-A9C383E8EF64}" dt="2021-09-22T15:56:19.454" v="2487" actId="20577"/>
           <ac:spMkLst>
             <pc:docMk/>
             <pc:sldMk cId="0" sldId="338"/>
@@ -308,7 +307,7 @@
           </ac:spMkLst>
         </pc:spChg>
         <pc:spChg chg="mod">
-          <ac:chgData name="Josh Stephens" userId="3c9335bfab62eb48" providerId="LiveId" clId="{B08DCA5E-E7AD-456B-8EC6-A9C383E8EF64}" dt="2021-09-12T18:43:11.818" v="1325" actId="14100"/>
+          <ac:chgData name="Josh Stephens" userId="3c9335bfab62eb48" providerId="LiveId" clId="{B08DCA5E-E7AD-456B-8EC6-A9C383E8EF64}" dt="2021-09-22T15:56:56.312" v="2509" actId="20577"/>
           <ac:spMkLst>
             <pc:docMk/>
             <pc:sldMk cId="0" sldId="338"/>
@@ -324,7 +323,7 @@
           </ac:spMkLst>
         </pc:spChg>
         <pc:spChg chg="mod">
-          <ac:chgData name="Josh Stephens" userId="3c9335bfab62eb48" providerId="LiveId" clId="{B08DCA5E-E7AD-456B-8EC6-A9C383E8EF64}" dt="2021-09-12T18:41:48.251" v="1216" actId="120"/>
+          <ac:chgData name="Josh Stephens" userId="3c9335bfab62eb48" providerId="LiveId" clId="{B08DCA5E-E7AD-456B-8EC6-A9C383E8EF64}" dt="2021-09-22T16:05:57.822" v="3189" actId="255"/>
           <ac:spMkLst>
             <pc:docMk/>
             <pc:sldMk cId="0" sldId="338"/>
@@ -332,7 +331,7 @@
           </ac:spMkLst>
         </pc:spChg>
         <pc:spChg chg="mod">
-          <ac:chgData name="Josh Stephens" userId="3c9335bfab62eb48" providerId="LiveId" clId="{B08DCA5E-E7AD-456B-8EC6-A9C383E8EF64}" dt="2021-09-12T18:24:35.642" v="412" actId="20577"/>
+          <ac:chgData name="Josh Stephens" userId="3c9335bfab62eb48" providerId="LiveId" clId="{B08DCA5E-E7AD-456B-8EC6-A9C383E8EF64}" dt="2021-09-22T15:57:10.703" v="2532" actId="20577"/>
           <ac:spMkLst>
             <pc:docMk/>
             <pc:sldMk cId="0" sldId="338"/>
@@ -340,7 +339,7 @@
           </ac:spMkLst>
         </pc:spChg>
         <pc:spChg chg="mod">
-          <ac:chgData name="Josh Stephens" userId="3c9335bfab62eb48" providerId="LiveId" clId="{B08DCA5E-E7AD-456B-8EC6-A9C383E8EF64}" dt="2021-09-12T18:45:44.175" v="1491" actId="14100"/>
+          <ac:chgData name="Josh Stephens" userId="3c9335bfab62eb48" providerId="LiveId" clId="{B08DCA5E-E7AD-456B-8EC6-A9C383E8EF64}" dt="2021-09-22T15:57:23.282" v="2581" actId="20577"/>
           <ac:spMkLst>
             <pc:docMk/>
             <pc:sldMk cId="0" sldId="338"/>
@@ -348,7 +347,7 @@
           </ac:spMkLst>
         </pc:spChg>
         <pc:spChg chg="mod">
-          <ac:chgData name="Josh Stephens" userId="3c9335bfab62eb48" providerId="LiveId" clId="{B08DCA5E-E7AD-456B-8EC6-A9C383E8EF64}" dt="2021-09-12T18:56:35.120" v="2012" actId="1076"/>
+          <ac:chgData name="Josh Stephens" userId="3c9335bfab62eb48" providerId="LiveId" clId="{B08DCA5E-E7AD-456B-8EC6-A9C383E8EF64}" dt="2021-09-22T15:57:38.705" v="2604" actId="20577"/>
           <ac:spMkLst>
             <pc:docMk/>
             <pc:sldMk cId="0" sldId="338"/>
@@ -356,7 +355,7 @@
           </ac:spMkLst>
         </pc:spChg>
         <pc:spChg chg="mod">
-          <ac:chgData name="Josh Stephens" userId="3c9335bfab62eb48" providerId="LiveId" clId="{B08DCA5E-E7AD-456B-8EC6-A9C383E8EF64}" dt="2021-09-12T18:56:44.450" v="2015" actId="14100"/>
+          <ac:chgData name="Josh Stephens" userId="3c9335bfab62eb48" providerId="LiveId" clId="{B08DCA5E-E7AD-456B-8EC6-A9C383E8EF64}" dt="2021-09-22T16:06:18.217" v="3195" actId="20577"/>
           <ac:spMkLst>
             <pc:docMk/>
             <pc:sldMk cId="0" sldId="338"/>
@@ -364,7 +363,7 @@
           </ac:spMkLst>
         </pc:spChg>
         <pc:spChg chg="mod">
-          <ac:chgData name="Josh Stephens" userId="3c9335bfab62eb48" providerId="LiveId" clId="{B08DCA5E-E7AD-456B-8EC6-A9C383E8EF64}" dt="2021-09-12T18:48:11.252" v="1608" actId="20577"/>
+          <ac:chgData name="Josh Stephens" userId="3c9335bfab62eb48" providerId="LiveId" clId="{B08DCA5E-E7AD-456B-8EC6-A9C383E8EF64}" dt="2021-09-22T15:58:27.316" v="2659" actId="20577"/>
           <ac:spMkLst>
             <pc:docMk/>
             <pc:sldMk cId="0" sldId="338"/>
@@ -372,7 +371,7 @@
           </ac:spMkLst>
         </pc:spChg>
         <pc:spChg chg="mod">
-          <ac:chgData name="Josh Stephens" userId="3c9335bfab62eb48" providerId="LiveId" clId="{B08DCA5E-E7AD-456B-8EC6-A9C383E8EF64}" dt="2021-09-12T18:48:58.183" v="1671" actId="14100"/>
+          <ac:chgData name="Josh Stephens" userId="3c9335bfab62eb48" providerId="LiveId" clId="{B08DCA5E-E7AD-456B-8EC6-A9C383E8EF64}" dt="2021-09-22T16:06:45.546" v="3214" actId="20577"/>
           <ac:spMkLst>
             <pc:docMk/>
             <pc:sldMk cId="0" sldId="338"/>
@@ -388,7 +387,7 @@
           </ac:spMkLst>
         </pc:spChg>
         <pc:spChg chg="mod">
-          <ac:chgData name="Josh Stephens" userId="3c9335bfab62eb48" providerId="LiveId" clId="{B08DCA5E-E7AD-456B-8EC6-A9C383E8EF64}" dt="2021-09-12T18:51:14.951" v="1894" actId="5793"/>
+          <ac:chgData name="Josh Stephens" userId="3c9335bfab62eb48" providerId="LiveId" clId="{B08DCA5E-E7AD-456B-8EC6-A9C383E8EF64}" dt="2021-09-22T16:07:01.685" v="3216" actId="255"/>
           <ac:spMkLst>
             <pc:docMk/>
             <pc:sldMk cId="0" sldId="338"/>
@@ -396,7 +395,7 @@
           </ac:spMkLst>
         </pc:spChg>
         <pc:spChg chg="mod">
-          <ac:chgData name="Josh Stephens" userId="3c9335bfab62eb48" providerId="LiveId" clId="{B08DCA5E-E7AD-456B-8EC6-A9C383E8EF64}" dt="2021-09-12T18:26:15.661" v="498" actId="20577"/>
+          <ac:chgData name="Josh Stephens" userId="3c9335bfab62eb48" providerId="LiveId" clId="{B08DCA5E-E7AD-456B-8EC6-A9C383E8EF64}" dt="2021-09-22T15:59:26.410" v="2735" actId="20577"/>
           <ac:spMkLst>
             <pc:docMk/>
             <pc:sldMk cId="0" sldId="338"/>
@@ -404,7 +403,7 @@
           </ac:spMkLst>
         </pc:spChg>
         <pc:spChg chg="mod">
-          <ac:chgData name="Josh Stephens" userId="3c9335bfab62eb48" providerId="LiveId" clId="{B08DCA5E-E7AD-456B-8EC6-A9C383E8EF64}" dt="2021-09-12T18:49:42.944" v="1746" actId="20577"/>
+          <ac:chgData name="Josh Stephens" userId="3c9335bfab62eb48" providerId="LiveId" clId="{B08DCA5E-E7AD-456B-8EC6-A9C383E8EF64}" dt="2021-09-22T16:06:54.682" v="3215" actId="255"/>
           <ac:spMkLst>
             <pc:docMk/>
             <pc:sldMk cId="0" sldId="338"/>
@@ -412,7 +411,7 @@
           </ac:spMkLst>
         </pc:spChg>
         <pc:spChg chg="mod">
-          <ac:chgData name="Josh Stephens" userId="3c9335bfab62eb48" providerId="LiveId" clId="{B08DCA5E-E7AD-456B-8EC6-A9C383E8EF64}" dt="2021-09-12T18:51:05.053" v="1892" actId="14100"/>
+          <ac:chgData name="Josh Stephens" userId="3c9335bfab62eb48" providerId="LiveId" clId="{B08DCA5E-E7AD-456B-8EC6-A9C383E8EF64}" dt="2021-09-22T16:01:22.115" v="2944" actId="20577"/>
           <ac:spMkLst>
             <pc:docMk/>
             <pc:sldMk cId="0" sldId="338"/>
@@ -420,7 +419,7 @@
           </ac:spMkLst>
         </pc:spChg>
         <pc:spChg chg="mod">
-          <ac:chgData name="Josh Stephens" userId="3c9335bfab62eb48" providerId="LiveId" clId="{B08DCA5E-E7AD-456B-8EC6-A9C383E8EF64}" dt="2021-09-12T18:52:13.797" v="1972" actId="20577"/>
+          <ac:chgData name="Josh Stephens" userId="3c9335bfab62eb48" providerId="LiveId" clId="{B08DCA5E-E7AD-456B-8EC6-A9C383E8EF64}" dt="2021-09-22T16:07:06.611" v="3217" actId="255"/>
           <ac:spMkLst>
             <pc:docMk/>
             <pc:sldMk cId="0" sldId="338"/>
@@ -428,7 +427,7 @@
           </ac:spMkLst>
         </pc:spChg>
         <pc:spChg chg="add mod">
-          <ac:chgData name="Josh Stephens" userId="3c9335bfab62eb48" providerId="LiveId" clId="{B08DCA5E-E7AD-456B-8EC6-A9C383E8EF64}" dt="2021-09-12T19:02:59.733" v="2046" actId="1076"/>
+          <ac:chgData name="Josh Stephens" userId="3c9335bfab62eb48" providerId="LiveId" clId="{B08DCA5E-E7AD-456B-8EC6-A9C383E8EF64}" dt="2021-09-22T15:54:17.797" v="2401" actId="20577"/>
           <ac:spMkLst>
             <pc:docMk/>
             <pc:sldMk cId="0" sldId="338"/>
@@ -436,7 +435,7 @@
           </ac:spMkLst>
         </pc:spChg>
         <pc:spChg chg="add mod">
-          <ac:chgData name="Josh Stephens" userId="3c9335bfab62eb48" providerId="LiveId" clId="{B08DCA5E-E7AD-456B-8EC6-A9C383E8EF64}" dt="2021-09-12T18:52:51.053" v="1980" actId="20577"/>
+          <ac:chgData name="Josh Stephens" userId="3c9335bfab62eb48" providerId="LiveId" clId="{B08DCA5E-E7AD-456B-8EC6-A9C383E8EF64}" dt="2021-09-22T15:54:03.151" v="2400" actId="20577"/>
           <ac:spMkLst>
             <pc:docMk/>
             <pc:sldMk cId="0" sldId="338"/>
@@ -507,6 +506,13 @@
             <ac:picMk id="43" creationId="{69377710-706E-445F-9CAA-F2A8B7570CB3}"/>
           </ac:picMkLst>
         </pc:picChg>
+      </pc:sldChg>
+      <pc:sldChg chg="del">
+        <pc:chgData name="Josh Stephens" userId="3c9335bfab62eb48" providerId="LiveId" clId="{B08DCA5E-E7AD-456B-8EC6-A9C383E8EF64}" dt="2021-09-16T00:04:42.495" v="2052" actId="2696"/>
+        <pc:sldMkLst>
+          <pc:docMk/>
+          <pc:sldMk cId="917409932" sldId="339"/>
+        </pc:sldMkLst>
       </pc:sldChg>
       <pc:sldMasterChg chg="modSldLayout">
         <pc:chgData name="Josh Stephens" userId="3c9335bfab62eb48" providerId="LiveId" clId="{B08DCA5E-E7AD-456B-8EC6-A9C383E8EF64}" dt="2021-09-12T19:04:10.491" v="2051" actId="2085"/>
@@ -10286,7 +10292,7 @@
           <a:p>
             <a:fld id="{6EBB0E32-0304-4451-ADB8-C044457D5B85}" type="datetimeFigureOut">
               <a:rPr lang="en-US" smtClean="0"/>
-              <a:t>9/12/2021</a:t>
+              <a:t>9/22/2021</a:t>
             </a:fld>
             <a:endParaRPr lang="en-US"/>
           </a:p>
@@ -11126,7 +11132,7 @@
           <a:p>
             <a:r>
               <a:rPr lang="en-US" sz="1200" dirty="0"/>
-              <a:t>from MongoDB for London &amp; NYC historical weather</a:t>
+              <a:t>from PostgreSQL for London &amp; NYC historical weather</a:t>
             </a:r>
           </a:p>
         </p:txBody>
@@ -11159,7 +11165,7 @@
           <a:p>
             <a:r>
               <a:rPr lang="en-US" dirty="0"/>
-              <a:t>Inputs - London</a:t>
+              <a:t>Input</a:t>
             </a:r>
           </a:p>
         </p:txBody>
@@ -11197,40 +11203,7 @@
             </a:pPr>
             <a:r>
               <a:rPr lang="en-US" sz="1200" dirty="0"/>
-              <a:t>•Monthly mean low temp</a:t>
-            </a:r>
-          </a:p>
-          <a:p>
-            <a:pPr algn="l">
-              <a:spcBef>
-                <a:spcPts val="0"/>
-              </a:spcBef>
-            </a:pPr>
-            <a:r>
-              <a:rPr lang="en-US" sz="1200" dirty="0"/>
-              <a:t>•Monthly air frost days</a:t>
-            </a:r>
-          </a:p>
-          <a:p>
-            <a:pPr algn="l">
-              <a:spcBef>
-                <a:spcPts val="0"/>
-              </a:spcBef>
-            </a:pPr>
-            <a:r>
-              <a:rPr lang="en-US" sz="1200" dirty="0"/>
-              <a:t>•Total monthly rainfall</a:t>
-            </a:r>
-          </a:p>
-          <a:p>
-            <a:pPr algn="l">
-              <a:spcBef>
-                <a:spcPts val="0"/>
-              </a:spcBef>
-            </a:pPr>
-            <a:r>
-              <a:rPr lang="en-US" sz="1200" dirty="0"/>
-              <a:t>•Total monthly sunshine hours</a:t>
+              <a:t>•Year</a:t>
             </a:r>
           </a:p>
         </p:txBody>
@@ -11258,7 +11231,7 @@
           <a:p>
             <a:r>
               <a:rPr lang="en-US" dirty="0"/>
-              <a:t>Inputs - NYC</a:t>
+              <a:t>Target</a:t>
             </a:r>
           </a:p>
         </p:txBody>
@@ -11296,40 +11269,6 @@
             <a:r>
               <a:rPr lang="en-US" dirty="0"/>
               <a:t> </a:t>
-            </a:r>
-          </a:p>
-        </p:txBody>
-      </p:sp>
-      <p:sp>
-        <p:nvSpPr>
-          <p:cNvPr id="11" name="Text Placeholder 10">
-            <a:extLst>
-              <a:ext uri="{FF2B5EF4-FFF2-40B4-BE49-F238E27FC236}">
-                <a16:creationId xmlns:a16="http://schemas.microsoft.com/office/drawing/2014/main" id="{F73C7655-7AD1-4499-8548-0DF446F69EAE}"/>
-              </a:ext>
-            </a:extLst>
-          </p:cNvPr>
-          <p:cNvSpPr>
-            <a:spLocks noGrp="1"/>
-          </p:cNvSpPr>
-          <p:nvPr>
-            <p:ph type="body" sz="quarter" idx="17"/>
-          </p:nvPr>
-        </p:nvSpPr>
-        <p:spPr>
-          <a:xfrm>
-            <a:off x="10123783" y="1616984"/>
-            <a:ext cx="993833" cy="613405"/>
-          </a:xfrm>
-        </p:spPr>
-        <p:txBody>
-          <a:bodyPr/>
-          <a:lstStyle/>
-          <a:p>
-            <a:pPr algn="l"/>
-            <a:r>
-              <a:rPr lang="en-US" sz="1200" dirty="0"/>
-              <a:t>Monthly average high temp </a:t>
             </a:r>
           </a:p>
         </p:txBody>
@@ -11357,7 +11296,7 @@
           <a:p>
             <a:r>
               <a:rPr lang="en-US" dirty="0"/>
-              <a:t> </a:t>
+              <a:t>  </a:t>
             </a:r>
           </a:p>
         </p:txBody>
@@ -11452,19 +11391,7 @@
             </a:pPr>
             <a:r>
               <a:rPr lang="en-US" sz="1200" dirty="0"/>
-              <a:t>•Drop months with data missing</a:t>
-            </a:r>
-          </a:p>
-          <a:p>
-            <a:pPr marL="0" indent="0" algn="l">
-              <a:spcBef>
-                <a:spcPts val="0"/>
-              </a:spcBef>
-              <a:buNone/>
-            </a:pPr>
-            <a:r>
-              <a:rPr lang="en-US" sz="1200" dirty="0"/>
-              <a:t>•Drop # flag for sensor type</a:t>
+              <a:t>•Not necessary as data was cleaned during EDA (dropped months with data missing, dropped # flag for sensor type)</a:t>
             </a:r>
           </a:p>
         </p:txBody>
@@ -11593,7 +11520,7 @@
             </a:pPr>
             <a:r>
               <a:rPr lang="en-US" sz="1200" dirty="0"/>
-              <a:t>•y (target) – monthly avg high temp</a:t>
+              <a:t>•X (input) - year</a:t>
             </a:r>
           </a:p>
           <a:p>
@@ -11605,7 +11532,7 @@
             </a:pPr>
             <a:r>
               <a:rPr lang="en-US" sz="1200" dirty="0"/>
-              <a:t>•X (inputs) – all other features</a:t>
+              <a:t>•y (target) – predicted weather feature</a:t>
             </a:r>
           </a:p>
         </p:txBody>
@@ -11745,7 +11672,7 @@
           <a:p>
             <a:r>
               <a:rPr lang="en-US" dirty="0"/>
-              <a:t>Standard Scaler</a:t>
+              <a:t>Our Model</a:t>
             </a:r>
           </a:p>
         </p:txBody>
@@ -11783,29 +11710,7 @@
             </a:pPr>
             <a:r>
               <a:rPr lang="en-US" sz="1200" dirty="0"/>
-              <a:t>•Create the instance</a:t>
-            </a:r>
-          </a:p>
-          <a:p>
-            <a:pPr algn="l">
-              <a:spcBef>
-                <a:spcPts val="0"/>
-              </a:spcBef>
-            </a:pPr>
-            <a:r>
-              <a:rPr lang="en-US" sz="1200" dirty="0"/>
-              <a:t>•Train the scaler</a:t>
-            </a:r>
-          </a:p>
-          <a:p>
-            <a:pPr algn="l">
-              <a:spcBef>
-                <a:spcPts val="0"/>
-              </a:spcBef>
-            </a:pPr>
-            <a:r>
-              <a:rPr lang="en-US" sz="1200" dirty="0"/>
-              <a:t>•Scale the training and testing inputs</a:t>
+              <a:t>•Linear Regression</a:t>
             </a:r>
           </a:p>
         </p:txBody>
@@ -11865,7 +11770,7 @@
               </a:spcBef>
             </a:pPr>
             <a:r>
-              <a:rPr lang="en-US" sz="1400" dirty="0"/>
+              <a:rPr lang="en-US" sz="1200" dirty="0"/>
               <a:t>•Training dataset (75%)</a:t>
             </a:r>
           </a:p>
@@ -11876,12 +11781,8 @@
               </a:spcBef>
             </a:pPr>
             <a:r>
-              <a:rPr lang="en-US" sz="1400" dirty="0"/>
-              <a:t>•</a:t>
-            </a:r>
-            <a:r>
-              <a:rPr lang="en-US" dirty="0"/>
-              <a:t> Testing dataset (25%)</a:t>
+              <a:rPr lang="en-US" sz="1200" dirty="0"/>
+              <a:t>• Testing dataset (25%)</a:t>
             </a:r>
           </a:p>
         </p:txBody>
@@ -11909,7 +11810,7 @@
           <a:p>
             <a:r>
               <a:rPr lang="en-US" dirty="0"/>
-              <a:t>Our Model</a:t>
+              <a:t>Train Our Model</a:t>
             </a:r>
           </a:p>
         </p:txBody>
@@ -11947,35 +11848,9 @@
             </a:pPr>
             <a:r>
               <a:rPr lang="en-US" sz="1200" dirty="0"/>
-              <a:t>•Neural network with two hidden layers (</a:t>
+              <a:t>•Fit on the training subset</a:t>
             </a:r>
-            <a:r>
-              <a:rPr lang="en-US" sz="1000" dirty="0"/>
-              <a:t>6 &amp; 4 neurons , </a:t>
-            </a:r>
-            <a:r>
-              <a:rPr lang="en-US" sz="1000" dirty="0" err="1"/>
-              <a:t>ReLU</a:t>
-            </a:r>
-            <a:r>
-              <a:rPr lang="en-US" sz="1000" dirty="0"/>
-              <a:t>)</a:t>
-            </a:r>
-          </a:p>
-          <a:p>
-            <a:pPr algn="l">
-              <a:spcBef>
-                <a:spcPts val="0"/>
-              </a:spcBef>
-            </a:pPr>
-            <a:r>
-              <a:rPr lang="en-US" sz="1200" dirty="0"/>
-              <a:t>•Output layer </a:t>
-            </a:r>
-            <a:r>
-              <a:rPr lang="en-US" sz="1000" dirty="0"/>
-              <a:t>( linear activation function)</a:t>
-            </a:r>
+            <a:endParaRPr lang="en-US" sz="1000" dirty="0"/>
           </a:p>
         </p:txBody>
       </p:sp>
@@ -12007,7 +11882,7 @@
           <a:p>
             <a:r>
               <a:rPr lang="en-US" dirty="0"/>
-              <a:t>Compile</a:t>
+              <a:t>Predict</a:t>
             </a:r>
           </a:p>
         </p:txBody>
@@ -12044,35 +11919,8 @@
               </a:spcBef>
             </a:pPr>
             <a:r>
-              <a:rPr lang="en-US" sz="1100" dirty="0"/>
-              <a:t>•Loss - MSE</a:t>
-            </a:r>
-          </a:p>
-          <a:p>
-            <a:pPr algn="l">
-              <a:spcBef>
-                <a:spcPts val="0"/>
-              </a:spcBef>
-            </a:pPr>
-            <a:r>
-              <a:rPr lang="en-US" sz="1100" dirty="0"/>
-              <a:t>•Optimizer - </a:t>
-            </a:r>
-            <a:r>
-              <a:rPr lang="en-US" sz="1100" dirty="0" err="1"/>
-              <a:t>adam</a:t>
-            </a:r>
-            <a:endParaRPr lang="en-US" sz="1100" dirty="0"/>
-          </a:p>
-          <a:p>
-            <a:pPr algn="l">
-              <a:spcBef>
-                <a:spcPts val="0"/>
-              </a:spcBef>
-            </a:pPr>
-            <a:r>
-              <a:rPr lang="en-US" sz="1100" dirty="0"/>
-              <a:t>•Metrics - MSE</a:t>
+              <a:rPr lang="en-US" sz="1200" dirty="0"/>
+              <a:t>•Weather feature based upon model</a:t>
             </a:r>
           </a:p>
         </p:txBody>
@@ -12100,7 +11948,7 @@
           <a:p>
             <a:r>
               <a:rPr lang="en-US" dirty="0"/>
-              <a:t>Train</a:t>
+              <a:t>Evaluate</a:t>
             </a:r>
           </a:p>
         </p:txBody>
@@ -12137,19 +11985,8 @@
               </a:spcBef>
             </a:pPr>
             <a:r>
-              <a:rPr lang="en-US" sz="1100" dirty="0"/>
-              <a:t>•Train on X train scaled data</a:t>
-            </a:r>
-          </a:p>
-          <a:p>
-            <a:pPr algn="l">
-              <a:spcBef>
-                <a:spcPts val="0"/>
-              </a:spcBef>
-            </a:pPr>
-            <a:r>
-              <a:rPr lang="en-US" sz="1100" dirty="0"/>
-              <a:t>•100 epochs</a:t>
+              <a:rPr lang="en-US" sz="1200" dirty="0"/>
+              <a:t>•Evaluate Mean Squared Error</a:t>
             </a:r>
           </a:p>
         </p:txBody>
@@ -12207,8 +12044,8 @@
               <a:buNone/>
             </a:pPr>
             <a:r>
-              <a:rPr lang="en-US" sz="1100" dirty="0"/>
-              <a:t>• Output the monthly average high temperature to optimize travel time to customer’s preference</a:t>
+              <a:rPr lang="en-US" sz="1200" dirty="0"/>
+              <a:t>• Use Mean Absolute Error and model output to create predicted range for each feature</a:t>
             </a:r>
           </a:p>
         </p:txBody>
@@ -12236,7 +12073,7 @@
           <a:p>
             <a:r>
               <a:rPr lang="en-US" dirty="0"/>
-              <a:t>Evaluate Model</a:t>
+              <a:t>Plot predictions vs. data</a:t>
             </a:r>
           </a:p>
         </p:txBody>
@@ -12264,8 +12101,8 @@
           <a:p>
             <a:pPr algn="l"/>
             <a:r>
-              <a:rPr lang="en-US" sz="1100" dirty="0"/>
-              <a:t>•Evaluate the performance of our model using Mean Squared Error</a:t>
+              <a:rPr lang="en-US" sz="1200" dirty="0"/>
+              <a:t>•Output scatter plot of datapoints with prediction line</a:t>
             </a:r>
           </a:p>
         </p:txBody>
@@ -12298,7 +12135,7 @@
           <a:p>
             <a:r>
               <a:rPr lang="en-US" dirty="0"/>
-              <a:t>Optimize Model</a:t>
+              <a:t>City Predictions</a:t>
             </a:r>
           </a:p>
         </p:txBody>
@@ -12326,8 +12163,8 @@
           <a:p>
             <a:pPr algn="l"/>
             <a:r>
-              <a:rPr lang="en-US" sz="1100" dirty="0"/>
-              <a:t>•Optimize our model’s performance as needed to improve accuracy</a:t>
+              <a:rPr lang="en-US" sz="1200" dirty="0"/>
+              <a:t>•Create DataFrame for each city allowing customers to select ideal travel month</a:t>
             </a:r>
           </a:p>
         </p:txBody>
@@ -12728,7 +12565,7 @@
           <a:p>
             <a:r>
               <a:rPr lang="en-US" dirty="0"/>
-              <a:t> Target</a:t>
+              <a:t> </a:t>
             </a:r>
           </a:p>
         </p:txBody>
@@ -12939,7 +12776,7 @@
             </a:pPr>
             <a:r>
               <a:rPr lang="en-US" sz="1200" dirty="0"/>
-              <a:t>•Monthly mean low temp</a:t>
+              <a:t>•Individual model for each month and city</a:t>
             </a:r>
           </a:p>
           <a:p>
@@ -12950,136 +12787,12 @@
             </a:pPr>
             <a:r>
               <a:rPr lang="en-US" sz="1200" dirty="0"/>
-              <a:t>•Total monthly precipitation</a:t>
-            </a:r>
-          </a:p>
-          <a:p>
-            <a:pPr algn="l">
-              <a:spcBef>
-                <a:spcPts val="0"/>
-              </a:spcBef>
-            </a:pPr>
-            <a:r>
-              <a:rPr lang="en-US" sz="1200" dirty="0"/>
-              <a:t>•Total monthly snowfall</a:t>
+              <a:t>• Target = predicted weather feature: avg high temp, total rainfall, total snowfall (NYC only), sunshine hours (London only)</a:t>
             </a:r>
           </a:p>
         </p:txBody>
       </p:sp>
     </p:spTree>
-  </p:cSld>
-  <p:clrMapOvr>
-    <a:masterClrMapping/>
-  </p:clrMapOvr>
-</p:sld>
-</file>
-
-<file path=ppt/slides/slide2.xml><?xml version="1.0" encoding="utf-8"?>
-<p:sld xmlns:a="http://schemas.openxmlformats.org/drawingml/2006/main" xmlns:r="http://schemas.openxmlformats.org/officeDocument/2006/relationships" xmlns:p="http://schemas.openxmlformats.org/presentationml/2006/main">
-  <p:cSld>
-    <p:spTree>
-      <p:nvGrpSpPr>
-        <p:cNvPr id="1" name=""/>
-        <p:cNvGrpSpPr/>
-        <p:nvPr/>
-      </p:nvGrpSpPr>
-      <p:grpSpPr>
-        <a:xfrm>
-          <a:off x="0" y="0"/>
-          <a:ext cx="0" cy="0"/>
-          <a:chOff x="0" y="0"/>
-          <a:chExt cx="0" cy="0"/>
-        </a:xfrm>
-      </p:grpSpPr>
-      <p:sp>
-        <p:nvSpPr>
-          <p:cNvPr id="2" name="Title 1">
-            <a:extLst>
-              <a:ext uri="{FF2B5EF4-FFF2-40B4-BE49-F238E27FC236}">
-                <a16:creationId xmlns:a16="http://schemas.microsoft.com/office/drawing/2014/main" id="{CAF9448C-C085-4FBB-B99B-1A3F6542F4C8}"/>
-              </a:ext>
-            </a:extLst>
-          </p:cNvPr>
-          <p:cNvSpPr>
-            <a:spLocks noGrp="1"/>
-          </p:cNvSpPr>
-          <p:nvPr>
-            <p:ph type="title"/>
-          </p:nvPr>
-        </p:nvSpPr>
-        <p:spPr/>
-        <p:txBody>
-          <a:bodyPr/>
-          <a:lstStyle/>
-          <a:p>
-            <a:r>
-              <a:rPr lang="en-US" dirty="0"/>
-              <a:t>Customize this Template</a:t>
-            </a:r>
-          </a:p>
-        </p:txBody>
-      </p:sp>
-      <p:sp>
-        <p:nvSpPr>
-          <p:cNvPr id="3" name="Text Placeholder 2">
-            <a:extLst>
-              <a:ext uri="{FF2B5EF4-FFF2-40B4-BE49-F238E27FC236}">
-                <a16:creationId xmlns:a16="http://schemas.microsoft.com/office/drawing/2014/main" id="{DEC2BB60-AC0C-467B-8BD5-4078AFD1CC81}"/>
-              </a:ext>
-            </a:extLst>
-          </p:cNvPr>
-          <p:cNvSpPr>
-            <a:spLocks noGrp="1"/>
-          </p:cNvSpPr>
-          <p:nvPr>
-            <p:ph type="body" sz="quarter" idx="13"/>
-          </p:nvPr>
-        </p:nvSpPr>
-        <p:spPr/>
-        <p:txBody>
-          <a:bodyPr/>
-          <a:lstStyle/>
-          <a:p>
-            <a:r>
-              <a:rPr lang="en-US" sz="3599" b="1" dirty="0">
-                <a:cs typeface="Arial" panose="020B0604020202020204" pitchFamily="34" charset="0"/>
-                <a:hlinkClick r:id="rId2">
-                  <a:extLst>
-                    <a:ext uri="{A12FA001-AC4F-418D-AE19-62706E023703}">
-                      <ahyp:hlinkClr xmlns:ahyp="http://schemas.microsoft.com/office/drawing/2018/hyperlinkcolor" val="tx"/>
-                    </a:ext>
-                  </a:extLst>
-                </a:hlinkClick>
-              </a:rPr>
-              <a:t>Template editing instructions </a:t>
-            </a:r>
-          </a:p>
-          <a:p>
-            <a:r>
-              <a:rPr lang="en-US" sz="3599" b="1" dirty="0">
-                <a:cs typeface="Arial" panose="020B0604020202020204" pitchFamily="34" charset="0"/>
-                <a:hlinkClick r:id="rId2">
-                  <a:extLst>
-                    <a:ext uri="{A12FA001-AC4F-418D-AE19-62706E023703}">
-                      <ahyp:hlinkClr xmlns:ahyp="http://schemas.microsoft.com/office/drawing/2018/hyperlinkcolor" val="tx"/>
-                    </a:ext>
-                  </a:extLst>
-                </a:hlinkClick>
-              </a:rPr>
-              <a:t>and feedback</a:t>
-            </a:r>
-            <a:endParaRPr lang="en-US" sz="3599" b="1" dirty="0">
-              <a:cs typeface="Arial" panose="020B0604020202020204" pitchFamily="34" charset="0"/>
-            </a:endParaRPr>
-          </a:p>
-        </p:txBody>
-      </p:sp>
-    </p:spTree>
-    <p:extLst>
-      <p:ext uri="{BB962C8B-B14F-4D97-AF65-F5344CB8AC3E}">
-        <p14:creationId xmlns:p14="http://schemas.microsoft.com/office/powerpoint/2010/main" val="917409932"/>
-      </p:ext>
-    </p:extLst>
   </p:cSld>
   <p:clrMapOvr>
     <a:masterClrMapping/>

</xml_diff>